<commit_message>
corrected a typo in the live lecture of forensics
</commit_message>
<xml_diff>
--- a/cits1003-lecture_slides/CITS1003-8 Forensics-exercises.pptx
+++ b/cits1003-lecture_slides/CITS1003-8 Forensics-exercises.pptx
@@ -48,7 +48,7 @@
     <p:sldId id="550" r:id="rId39"/>
     <p:sldId id="455" r:id="rId40"/>
     <p:sldId id="551" r:id="rId41"/>
-    <p:sldId id="553" r:id="rId42"/>
+    <p:sldId id="580" r:id="rId42"/>
     <p:sldId id="563" r:id="rId43"/>
     <p:sldId id="552" r:id="rId44"/>
     <p:sldId id="554" r:id="rId45"/>
@@ -13254,7 +13254,7 @@
           </a:effectLst>
           <a:extLst>
             <a:ext uri="{91240B29-F687-4f45-9708-019B960494DF}">
-              <a14:hiddenLine xmlns:a16="http://schemas.microsoft.com/office/drawing/2014/main" xmlns:p14="http://schemas.microsoft.com/office/powerpoint/2010/main" xmlns:a14="http://schemas.microsoft.com/office/drawing/2010/main" xmlns="" w="9525">
+              <a14:hiddenLine xmlns="" xmlns:a14="http://schemas.microsoft.com/office/drawing/2010/main" xmlns:p14="http://schemas.microsoft.com/office/powerpoint/2010/main" xmlns:a16="http://schemas.microsoft.com/office/drawing/2014/main" w="9525">
                 <a:solidFill>
                   <a:srgbClr val="000000"/>
                 </a:solidFill>
@@ -21738,7 +21738,7 @@
               <a:rPr lang="en-AU" sz="2400" dirty="0">
                 <a:latin typeface="Courier New" panose="02070309020205020404" pitchFamily="49" charset="0"/>
               </a:rPr>
-              <a:t>10010101 00001101 11001001</a:t>
+              <a:t>10010101 00001101 01001001</a:t>
             </a:r>
             <a:endParaRPr lang="en-AU" sz="2400" dirty="0"/>
           </a:p>
@@ -21790,7 +21790,7 @@
               <a:rPr lang="en-AU" sz="2400" dirty="0">
                 <a:latin typeface="Courier New" panose="02070309020205020404" pitchFamily="49" charset="0"/>
               </a:rPr>
-              <a:t>0001101 11001001</a:t>
+              <a:t>0001101 01001001</a:t>
             </a:r>
             <a:endParaRPr lang="en-AU" sz="2400" dirty="0"/>
           </a:p>
@@ -22192,7 +22192,7 @@
             </a:pPr>
             <a:r>
               <a:rPr lang="en-AU" sz="2600" dirty="0"/>
-              <a:t>(149, 13, 201)</a:t>
+              <a:t>(149, 13, 73)</a:t>
             </a:r>
             <a:endParaRPr lang="en-AU" sz="2667" dirty="0"/>
           </a:p>
@@ -22683,7 +22683,7 @@
               <a:rPr lang="en-AU" sz="2400" dirty="0">
                 <a:latin typeface="Courier New" panose="02070309020205020404" pitchFamily="49" charset="0"/>
               </a:rPr>
-              <a:t>10010101 00001101 1100100</a:t>
+              <a:t>10010101 00001101 0100100</a:t>
             </a:r>
             <a:r>
               <a:rPr lang="en-AU" sz="2400" dirty="0">
@@ -23941,7 +23941,7 @@
             </a:r>
             <a:r>
               <a:rPr lang="en-AU" sz="2600" dirty="0"/>
-              <a:t>, 201)</a:t>
+              <a:t>, 73)</a:t>
             </a:r>
           </a:p>
           <a:p>
@@ -24354,7 +24354,7 @@
                   <a:srgbClr val="FF0000"/>
                 </a:solidFill>
               </a:rPr>
-              <a:t>200</a:t>
+              <a:t>72</a:t>
             </a:r>
             <a:r>
               <a:rPr lang="en-AU" sz="2600" dirty="0"/>
@@ -24387,7 +24387,7 @@
     </p:spTree>
     <p:extLst>
       <p:ext uri="{BB962C8B-B14F-4D97-AF65-F5344CB8AC3E}">
-        <p14:creationId xmlns:p14="http://schemas.microsoft.com/office/powerpoint/2010/main" val="1187028463"/>
+        <p14:creationId xmlns:p14="http://schemas.microsoft.com/office/powerpoint/2010/main" val="2614180833"/>
       </p:ext>
     </p:extLst>
   </p:cSld>

</xml_diff>